<commit_message>
Added some TF and changed presentation
</commit_message>
<xml_diff>
--- a/DatainCloud.pptx
+++ b/DatainCloud.pptx
@@ -5,7 +5,7 @@
     <p:sldMasterId id="2147483648" r:id="rId1"/>
   </p:sldMasterIdLst>
   <p:notesMasterIdLst>
-    <p:notesMasterId r:id="rId13"/>
+    <p:notesMasterId r:id="rId14"/>
   </p:notesMasterIdLst>
   <p:sldIdLst>
     <p:sldId id="256" r:id="rId2"/>
@@ -18,12 +18,13 @@
     <p:sldId id="264" r:id="rId9"/>
     <p:sldId id="265" r:id="rId10"/>
     <p:sldId id="266" r:id="rId11"/>
-    <p:sldId id="267" r:id="rId12"/>
+    <p:sldId id="268" r:id="rId12"/>
+    <p:sldId id="267" r:id="rId13"/>
   </p:sldIdLst>
   <p:sldSz cx="9144000" cy="6858000" type="screen4x3"/>
   <p:notesSz cx="6858000" cy="9144000"/>
   <p:custDataLst>
-    <p:tags r:id="rId14"/>
+    <p:tags r:id="rId15"/>
   </p:custDataLst>
   <p:defaultTextStyle>
     <a:defPPr>
@@ -3724,7 +3725,7 @@
           <p:cNvPr id="4" name="Object 3" hidden="1">
             <a:extLst>
               <a:ext uri="{FF2B5EF4-FFF2-40B4-BE49-F238E27FC236}">
-                <a16:creationId xmlns:a16="http://schemas.microsoft.com/office/drawing/2014/main" id="{C9E9BBA2-5B28-4E0D-BAAF-B403E7B272FA}"/>
+                <a16:creationId xmlns:a16="http://schemas.microsoft.com/office/drawing/2014/main" id="{F5438AD7-B5AF-459D-94B2-FB6A29D55282}"/>
               </a:ext>
             </a:extLst>
           </p:cNvPr>
@@ -3737,7 +3738,7 @@
             </p:custDataLst>
             <p:extLst>
               <p:ext uri="{D42A27DB-BD31-4B8C-83A1-F6EECF244321}">
-                <p14:modId xmlns:p14="http://schemas.microsoft.com/office/powerpoint/2010/main" val="3529112355"/>
+                <p14:modId xmlns:p14="http://schemas.microsoft.com/office/powerpoint/2010/main" val="1771808789"/>
               </p:ext>
             </p:extLst>
           </p:nvPr>
@@ -3790,7 +3791,7 @@
           <p:cNvPr id="2" name="Title 1">
             <a:extLst>
               <a:ext uri="{FF2B5EF4-FFF2-40B4-BE49-F238E27FC236}">
-                <a16:creationId xmlns:a16="http://schemas.microsoft.com/office/drawing/2014/main" id="{4FC36638-EAE1-4D9E-A170-5A3D8BC14661}"/>
+                <a16:creationId xmlns:a16="http://schemas.microsoft.com/office/drawing/2014/main" id="{831F23E2-FCC0-4425-ABBE-8702C8B99F4D}"/>
               </a:ext>
             </a:extLst>
           </p:cNvPr>
@@ -3809,8 +3810,8 @@
           <a:lstStyle/>
           <a:p>
             <a:r>
-              <a:rPr lang="en-US" dirty="0"/>
-              <a:t>Workshop exercise</a:t>
+              <a:rPr lang="en-US"/>
+              <a:t>IAC and CI/CD</a:t>
             </a:r>
           </a:p>
         </p:txBody>
@@ -3818,7 +3819,7 @@
     </p:spTree>
     <p:extLst>
       <p:ext uri="{BB962C8B-B14F-4D97-AF65-F5344CB8AC3E}">
-        <p14:creationId xmlns:p14="http://schemas.microsoft.com/office/powerpoint/2010/main" val="2740782440"/>
+        <p14:creationId xmlns:p14="http://schemas.microsoft.com/office/powerpoint/2010/main" val="986739705"/>
       </p:ext>
     </p:extLst>
   </p:cSld>
@@ -3828,7 +3829,7 @@
 </p:sld>
 </file>
 
-<file path=ppt/slides/slide2.xml><?xml version="1.0" encoding="utf-8"?>
+<file path=ppt/slides/slide12.xml><?xml version="1.0" encoding="utf-8"?>
 <p:sld xmlns:a="http://schemas.openxmlformats.org/drawingml/2006/main" xmlns:r="http://schemas.openxmlformats.org/officeDocument/2006/relationships" xmlns:p="http://schemas.openxmlformats.org/presentationml/2006/main">
   <p:cSld>
     <p:spTree>
@@ -3847,10 +3848,10 @@
       </p:grpSpPr>
       <p:graphicFrame>
         <p:nvGraphicFramePr>
-          <p:cNvPr id="3" name="Object 2" hidden="1">
+          <p:cNvPr id="4" name="Object 3" hidden="1">
             <a:extLst>
               <a:ext uri="{FF2B5EF4-FFF2-40B4-BE49-F238E27FC236}">
-                <a16:creationId xmlns:a16="http://schemas.microsoft.com/office/drawing/2014/main" id="{69E8DFD5-A89D-48DB-8B72-032D8F03CD44}"/>
+                <a16:creationId xmlns:a16="http://schemas.microsoft.com/office/drawing/2014/main" id="{C9E9BBA2-5B28-4E0D-BAAF-B403E7B272FA}"/>
               </a:ext>
             </a:extLst>
           </p:cNvPr>
@@ -3863,7 +3864,7 @@
             </p:custDataLst>
             <p:extLst>
               <p:ext uri="{D42A27DB-BD31-4B8C-83A1-F6EECF244321}">
-                <p14:modId xmlns:p14="http://schemas.microsoft.com/office/powerpoint/2010/main" val="4231334975"/>
+                <p14:modId xmlns:p14="http://schemas.microsoft.com/office/powerpoint/2010/main" val="3529112355"/>
               </p:ext>
             </p:extLst>
           </p:nvPr>
@@ -3913,6 +3914,132 @@
       </p:graphicFrame>
       <p:sp>
         <p:nvSpPr>
+          <p:cNvPr id="2" name="Title 1">
+            <a:extLst>
+              <a:ext uri="{FF2B5EF4-FFF2-40B4-BE49-F238E27FC236}">
+                <a16:creationId xmlns:a16="http://schemas.microsoft.com/office/drawing/2014/main" id="{4FC36638-EAE1-4D9E-A170-5A3D8BC14661}"/>
+              </a:ext>
+            </a:extLst>
+          </p:cNvPr>
+          <p:cNvSpPr>
+            <a:spLocks noGrp="1"/>
+          </p:cNvSpPr>
+          <p:nvPr>
+            <p:ph type="title"/>
+          </p:nvPr>
+        </p:nvSpPr>
+        <p:spPr/>
+        <p:txBody>
+          <a:bodyPr vert="horz">
+            <a:normAutofit/>
+          </a:bodyPr>
+          <a:lstStyle/>
+          <a:p>
+            <a:r>
+              <a:rPr lang="en-US" dirty="0"/>
+              <a:t>Workshop exercise</a:t>
+            </a:r>
+          </a:p>
+        </p:txBody>
+      </p:sp>
+    </p:spTree>
+    <p:extLst>
+      <p:ext uri="{BB962C8B-B14F-4D97-AF65-F5344CB8AC3E}">
+        <p14:creationId xmlns:p14="http://schemas.microsoft.com/office/powerpoint/2010/main" val="2740782440"/>
+      </p:ext>
+    </p:extLst>
+  </p:cSld>
+  <p:clrMapOvr>
+    <a:masterClrMapping/>
+  </p:clrMapOvr>
+</p:sld>
+</file>
+
+<file path=ppt/slides/slide2.xml><?xml version="1.0" encoding="utf-8"?>
+<p:sld xmlns:a="http://schemas.openxmlformats.org/drawingml/2006/main" xmlns:r="http://schemas.openxmlformats.org/officeDocument/2006/relationships" xmlns:p="http://schemas.openxmlformats.org/presentationml/2006/main">
+  <p:cSld>
+    <p:spTree>
+      <p:nvGrpSpPr>
+        <p:cNvPr id="1" name=""/>
+        <p:cNvGrpSpPr/>
+        <p:nvPr/>
+      </p:nvGrpSpPr>
+      <p:grpSpPr>
+        <a:xfrm>
+          <a:off x="0" y="0"/>
+          <a:ext cx="0" cy="0"/>
+          <a:chOff x="0" y="0"/>
+          <a:chExt cx="0" cy="0"/>
+        </a:xfrm>
+      </p:grpSpPr>
+      <p:graphicFrame>
+        <p:nvGraphicFramePr>
+          <p:cNvPr id="3" name="Object 2" hidden="1">
+            <a:extLst>
+              <a:ext uri="{FF2B5EF4-FFF2-40B4-BE49-F238E27FC236}">
+                <a16:creationId xmlns:a16="http://schemas.microsoft.com/office/drawing/2014/main" id="{69E8DFD5-A89D-48DB-8B72-032D8F03CD44}"/>
+              </a:ext>
+            </a:extLst>
+          </p:cNvPr>
+          <p:cNvGraphicFramePr>
+            <a:graphicFrameLocks noChangeAspect="1"/>
+          </p:cNvGraphicFramePr>
+          <p:nvPr>
+            <p:custDataLst>
+              <p:tags r:id="rId1"/>
+            </p:custDataLst>
+            <p:extLst>
+              <p:ext uri="{D42A27DB-BD31-4B8C-83A1-F6EECF244321}">
+                <p14:modId xmlns:p14="http://schemas.microsoft.com/office/powerpoint/2010/main" val="4231334975"/>
+              </p:ext>
+            </p:extLst>
+          </p:nvPr>
+        </p:nvGraphicFramePr>
+        <p:xfrm>
+          <a:off x="1588" y="1588"/>
+          <a:ext cx="1588" cy="1588"/>
+        </p:xfrm>
+        <a:graphic>
+          <a:graphicData uri="http://schemas.openxmlformats.org/presentationml/2006/ole">
+            <mc:AlternateContent xmlns:mc="http://schemas.openxmlformats.org/markup-compatibility/2006">
+              <mc:Choice xmlns:v="urn:schemas-microsoft-com:vml" Requires="v">
+                <p:oleObj name="think-cell Slide" r:id="rId3" imgW="261" imgH="351" progId="TCLayout.ActiveDocument.1">
+                  <p:embed/>
+                </p:oleObj>
+              </mc:Choice>
+              <mc:Fallback>
+                <p:oleObj name="think-cell Slide" r:id="rId3" imgW="261" imgH="351" progId="TCLayout.ActiveDocument.1">
+                  <p:embed/>
+                  <p:pic>
+                    <p:nvPicPr>
+                      <p:cNvPr id="0" name=""/>
+                      <p:cNvPicPr/>
+                      <p:nvPr/>
+                    </p:nvPicPr>
+                    <p:blipFill>
+                      <a:blip r:embed="rId4"/>
+                      <a:stretch>
+                        <a:fillRect/>
+                      </a:stretch>
+                    </p:blipFill>
+                    <p:spPr>
+                      <a:xfrm>
+                        <a:off x="1588" y="1588"/>
+                        <a:ext cx="1588" cy="1588"/>
+                      </a:xfrm>
+                      <a:prstGeom prst="rect">
+                        <a:avLst/>
+                      </a:prstGeom>
+                    </p:spPr>
+                  </p:pic>
+                </p:oleObj>
+              </mc:Fallback>
+            </mc:AlternateContent>
+          </a:graphicData>
+        </a:graphic>
+      </p:graphicFrame>
+      <p:sp>
+        <p:nvSpPr>
           <p:cNvPr id="2" name="Title 1"/>
           <p:cNvSpPr>
             <a:spLocks noGrp="1"/>
@@ -3949,7 +4076,7 @@
         <p:spPr>
           <a:xfrm>
             <a:off x="457200" y="1600200"/>
-            <a:ext cx="8229600" cy="4721292"/>
+            <a:ext cx="8229600" cy="5312223"/>
           </a:xfrm>
           <a:prstGeom prst="rect">
             <a:avLst/>
@@ -4078,6 +4205,12 @@
             <a:r>
               <a:rPr lang="en-US" dirty="0"/>
               <a:t>General architecture</a:t>
+            </a:r>
+          </a:p>
+          <a:p>
+            <a:r>
+              <a:rPr lang="en-US" dirty="0"/>
+              <a:t>IAC and CI/CD</a:t>
             </a:r>
           </a:p>
           <a:p>
@@ -6872,6 +7005,12 @@
 </file>
 
 <file path=ppt/tags/tag15.xml><?xml version="1.0" encoding="utf-8"?>
+<p:tagLst xmlns:a="http://schemas.openxmlformats.org/drawingml/2006/main" xmlns:r="http://schemas.openxmlformats.org/officeDocument/2006/relationships" xmlns:p="http://schemas.openxmlformats.org/presentationml/2006/main">
+  <p:tag name="THINKCELLSHAPEDONOTDELETE" val="thinkcellActiveDocDoNotDelete"/>
+</p:tagLst>
+</file>
+
+<file path=ppt/tags/tag16.xml><?xml version="1.0" encoding="utf-8"?>
 <p:tagLst xmlns:a="http://schemas.openxmlformats.org/drawingml/2006/main" xmlns:r="http://schemas.openxmlformats.org/officeDocument/2006/relationships" xmlns:p="http://schemas.openxmlformats.org/presentationml/2006/main">
   <p:tag name="THINKCELLSHAPEDONOTDELETE" val="thinkcellActiveDocDoNotDelete"/>
 </p:tagLst>

</xml_diff>